<commit_message>
Ajustes para el eliminado suave
</commit_message>
<xml_diff>
--- a/DIapositivas_Game_Time.pptx
+++ b/DIapositivas_Game_Time.pptx
@@ -249,7 +249,7 @@
           <a:p>
             <a:fld id="{88369B9F-131C-2846-AB8F-CEE154B4CAEB}" type="datetimeFigureOut">
               <a:rPr lang="es-CO" smtClean="0"/>
-              <a:t>31/07/2025</a:t>
+              <a:t>5/08/2025</a:t>
             </a:fld>
             <a:endParaRPr lang="es-CO"/>
           </a:p>
@@ -426,7 +426,7 @@
           <a:p>
             <a:fld id="{9660CB96-A603-FF42-AE46-F5F75F80A67B}" type="datetimeFigureOut">
               <a:rPr lang="es-CO" smtClean="0"/>
-              <a:t>31/07/2025</a:t>
+              <a:t>5/08/2025</a:t>
             </a:fld>
             <a:endParaRPr lang="es-CO"/>
           </a:p>
@@ -843,7 +843,7 @@
           <a:p>
             <a:fld id="{BD986248-06F7-A441-A47A-264EBD310E11}" type="datetimeFigureOut">
               <a:rPr lang="es-CO" smtClean="0"/>
-              <a:t>31/07/2025</a:t>
+              <a:t>5/08/2025</a:t>
             </a:fld>
             <a:endParaRPr lang="es-CO"/>
           </a:p>
@@ -1043,7 +1043,7 @@
           <a:p>
             <a:fld id="{BD986248-06F7-A441-A47A-264EBD310E11}" type="datetimeFigureOut">
               <a:rPr lang="es-CO" smtClean="0"/>
-              <a:t>31/07/2025</a:t>
+              <a:t>5/08/2025</a:t>
             </a:fld>
             <a:endParaRPr lang="es-CO"/>
           </a:p>
@@ -1253,7 +1253,7 @@
           <a:p>
             <a:fld id="{BD986248-06F7-A441-A47A-264EBD310E11}" type="datetimeFigureOut">
               <a:rPr lang="es-CO" smtClean="0"/>
-              <a:t>31/07/2025</a:t>
+              <a:t>5/08/2025</a:t>
             </a:fld>
             <a:endParaRPr lang="es-CO"/>
           </a:p>
@@ -1414,7 +1414,7 @@
           <a:p>
             <a:fld id="{BD986248-06F7-A441-A47A-264EBD310E11}" type="datetimeFigureOut">
               <a:rPr lang="es-CO" smtClean="0"/>
-              <a:t>31/07/2025</a:t>
+              <a:t>5/08/2025</a:t>
             </a:fld>
             <a:endParaRPr lang="es-CO"/>
           </a:p>
@@ -1614,7 +1614,7 @@
           <a:p>
             <a:fld id="{BD986248-06F7-A441-A47A-264EBD310E11}" type="datetimeFigureOut">
               <a:rPr lang="es-CO" smtClean="0"/>
-              <a:t>31/07/2025</a:t>
+              <a:t>5/08/2025</a:t>
             </a:fld>
             <a:endParaRPr lang="es-CO"/>
           </a:p>
@@ -1890,7 +1890,7 @@
           <a:p>
             <a:fld id="{BD986248-06F7-A441-A47A-264EBD310E11}" type="datetimeFigureOut">
               <a:rPr lang="es-CO" smtClean="0"/>
-              <a:t>31/07/2025</a:t>
+              <a:t>5/08/2025</a:t>
             </a:fld>
             <a:endParaRPr lang="es-CO"/>
           </a:p>
@@ -2158,7 +2158,7 @@
           <a:p>
             <a:fld id="{BD986248-06F7-A441-A47A-264EBD310E11}" type="datetimeFigureOut">
               <a:rPr lang="es-CO" smtClean="0"/>
-              <a:t>31/07/2025</a:t>
+              <a:t>5/08/2025</a:t>
             </a:fld>
             <a:endParaRPr lang="es-CO"/>
           </a:p>
@@ -2573,7 +2573,7 @@
           <a:p>
             <a:fld id="{BD986248-06F7-A441-A47A-264EBD310E11}" type="datetimeFigureOut">
               <a:rPr lang="es-CO" smtClean="0"/>
-              <a:t>31/07/2025</a:t>
+              <a:t>5/08/2025</a:t>
             </a:fld>
             <a:endParaRPr lang="es-CO"/>
           </a:p>
@@ -2715,7 +2715,7 @@
           <a:p>
             <a:fld id="{BD986248-06F7-A441-A47A-264EBD310E11}" type="datetimeFigureOut">
               <a:rPr lang="es-CO" smtClean="0"/>
-              <a:t>31/07/2025</a:t>
+              <a:t>5/08/2025</a:t>
             </a:fld>
             <a:endParaRPr lang="es-CO"/>
           </a:p>
@@ -2828,7 +2828,7 @@
           <a:p>
             <a:fld id="{BD986248-06F7-A441-A47A-264EBD310E11}" type="datetimeFigureOut">
               <a:rPr lang="es-CO" smtClean="0"/>
-              <a:t>31/07/2025</a:t>
+              <a:t>5/08/2025</a:t>
             </a:fld>
             <a:endParaRPr lang="es-CO"/>
           </a:p>
@@ -3157,7 +3157,7 @@
           <a:p>
             <a:fld id="{BD986248-06F7-A441-A47A-264EBD310E11}" type="datetimeFigureOut">
               <a:rPr lang="es-CO" smtClean="0"/>
-              <a:t>31/07/2025</a:t>
+              <a:t>5/08/2025</a:t>
             </a:fld>
             <a:endParaRPr lang="es-CO"/>
           </a:p>
@@ -3446,7 +3446,7 @@
           <a:p>
             <a:fld id="{BD986248-06F7-A441-A47A-264EBD310E11}" type="datetimeFigureOut">
               <a:rPr lang="es-CO" smtClean="0"/>
-              <a:t>31/07/2025</a:t>
+              <a:t>5/08/2025</a:t>
             </a:fld>
             <a:endParaRPr lang="es-CO"/>
           </a:p>
@@ -3689,7 +3689,7 @@
           <a:p>
             <a:fld id="{BD986248-06F7-A441-A47A-264EBD310E11}" type="datetimeFigureOut">
               <a:rPr lang="es-CO" smtClean="0"/>
-              <a:t>31/07/2025</a:t>
+              <a:t>5/08/2025</a:t>
             </a:fld>
             <a:endParaRPr lang="es-CO"/>
           </a:p>
@@ -8088,10 +8088,10 @@
       </p:sp>
       <p:pic>
         <p:nvPicPr>
-          <p:cNvPr id="4" name="Imagen 3">
-            <a:extLst>
-              <a:ext uri="{FF2B5EF4-FFF2-40B4-BE49-F238E27FC236}">
-                <a16:creationId xmlns:a16="http://schemas.microsoft.com/office/drawing/2014/main" id="{DED14B90-DAFC-FB7A-2E62-4261B8861D6F}"/>
+          <p:cNvPr id="5" name="Imagen 4" descr="Diagrama, Esquemático&#10;&#10;El contenido generado por IA puede ser incorrecto.">
+            <a:extLst>
+              <a:ext uri="{FF2B5EF4-FFF2-40B4-BE49-F238E27FC236}">
+                <a16:creationId xmlns:a16="http://schemas.microsoft.com/office/drawing/2014/main" id="{26203FE5-2605-8760-2E8C-06F467A18DB3}"/>
               </a:ext>
             </a:extLst>
           </p:cNvPr>
@@ -8108,8 +8108,8 @@
         </p:blipFill>
         <p:spPr>
           <a:xfrm>
-            <a:off x="659567" y="1439056"/>
-            <a:ext cx="10568066" cy="5201587"/>
+            <a:off x="220709" y="1409074"/>
+            <a:ext cx="11971291" cy="5448925"/>
           </a:xfrm>
           <a:prstGeom prst="rect">
             <a:avLst/>

</xml_diff>

<commit_message>
ajuste en las consultas SQL y en la eliminacion de los usuarios
</commit_message>
<xml_diff>
--- a/DIapositivas_Game_Time.pptx
+++ b/DIapositivas_Game_Time.pptx
@@ -249,7 +249,7 @@
           <a:p>
             <a:fld id="{88369B9F-131C-2846-AB8F-CEE154B4CAEB}" type="datetimeFigureOut">
               <a:rPr lang="es-CO" smtClean="0"/>
-              <a:t>5/08/2025</a:t>
+              <a:t>6/08/2025</a:t>
             </a:fld>
             <a:endParaRPr lang="es-CO"/>
           </a:p>
@@ -426,7 +426,7 @@
           <a:p>
             <a:fld id="{9660CB96-A603-FF42-AE46-F5F75F80A67B}" type="datetimeFigureOut">
               <a:rPr lang="es-CO" smtClean="0"/>
-              <a:t>5/08/2025</a:t>
+              <a:t>6/08/2025</a:t>
             </a:fld>
             <a:endParaRPr lang="es-CO"/>
           </a:p>
@@ -843,7 +843,7 @@
           <a:p>
             <a:fld id="{BD986248-06F7-A441-A47A-264EBD310E11}" type="datetimeFigureOut">
               <a:rPr lang="es-CO" smtClean="0"/>
-              <a:t>5/08/2025</a:t>
+              <a:t>6/08/2025</a:t>
             </a:fld>
             <a:endParaRPr lang="es-CO"/>
           </a:p>
@@ -1043,7 +1043,7 @@
           <a:p>
             <a:fld id="{BD986248-06F7-A441-A47A-264EBD310E11}" type="datetimeFigureOut">
               <a:rPr lang="es-CO" smtClean="0"/>
-              <a:t>5/08/2025</a:t>
+              <a:t>6/08/2025</a:t>
             </a:fld>
             <a:endParaRPr lang="es-CO"/>
           </a:p>
@@ -1253,7 +1253,7 @@
           <a:p>
             <a:fld id="{BD986248-06F7-A441-A47A-264EBD310E11}" type="datetimeFigureOut">
               <a:rPr lang="es-CO" smtClean="0"/>
-              <a:t>5/08/2025</a:t>
+              <a:t>6/08/2025</a:t>
             </a:fld>
             <a:endParaRPr lang="es-CO"/>
           </a:p>
@@ -1414,7 +1414,7 @@
           <a:p>
             <a:fld id="{BD986248-06F7-A441-A47A-264EBD310E11}" type="datetimeFigureOut">
               <a:rPr lang="es-CO" smtClean="0"/>
-              <a:t>5/08/2025</a:t>
+              <a:t>6/08/2025</a:t>
             </a:fld>
             <a:endParaRPr lang="es-CO"/>
           </a:p>
@@ -1614,7 +1614,7 @@
           <a:p>
             <a:fld id="{BD986248-06F7-A441-A47A-264EBD310E11}" type="datetimeFigureOut">
               <a:rPr lang="es-CO" smtClean="0"/>
-              <a:t>5/08/2025</a:t>
+              <a:t>6/08/2025</a:t>
             </a:fld>
             <a:endParaRPr lang="es-CO"/>
           </a:p>
@@ -1890,7 +1890,7 @@
           <a:p>
             <a:fld id="{BD986248-06F7-A441-A47A-264EBD310E11}" type="datetimeFigureOut">
               <a:rPr lang="es-CO" smtClean="0"/>
-              <a:t>5/08/2025</a:t>
+              <a:t>6/08/2025</a:t>
             </a:fld>
             <a:endParaRPr lang="es-CO"/>
           </a:p>
@@ -2158,7 +2158,7 @@
           <a:p>
             <a:fld id="{BD986248-06F7-A441-A47A-264EBD310E11}" type="datetimeFigureOut">
               <a:rPr lang="es-CO" smtClean="0"/>
-              <a:t>5/08/2025</a:t>
+              <a:t>6/08/2025</a:t>
             </a:fld>
             <a:endParaRPr lang="es-CO"/>
           </a:p>
@@ -2573,7 +2573,7 @@
           <a:p>
             <a:fld id="{BD986248-06F7-A441-A47A-264EBD310E11}" type="datetimeFigureOut">
               <a:rPr lang="es-CO" smtClean="0"/>
-              <a:t>5/08/2025</a:t>
+              <a:t>6/08/2025</a:t>
             </a:fld>
             <a:endParaRPr lang="es-CO"/>
           </a:p>
@@ -2715,7 +2715,7 @@
           <a:p>
             <a:fld id="{BD986248-06F7-A441-A47A-264EBD310E11}" type="datetimeFigureOut">
               <a:rPr lang="es-CO" smtClean="0"/>
-              <a:t>5/08/2025</a:t>
+              <a:t>6/08/2025</a:t>
             </a:fld>
             <a:endParaRPr lang="es-CO"/>
           </a:p>
@@ -2828,7 +2828,7 @@
           <a:p>
             <a:fld id="{BD986248-06F7-A441-A47A-264EBD310E11}" type="datetimeFigureOut">
               <a:rPr lang="es-CO" smtClean="0"/>
-              <a:t>5/08/2025</a:t>
+              <a:t>6/08/2025</a:t>
             </a:fld>
             <a:endParaRPr lang="es-CO"/>
           </a:p>
@@ -3157,7 +3157,7 @@
           <a:p>
             <a:fld id="{BD986248-06F7-A441-A47A-264EBD310E11}" type="datetimeFigureOut">
               <a:rPr lang="es-CO" smtClean="0"/>
-              <a:t>5/08/2025</a:t>
+              <a:t>6/08/2025</a:t>
             </a:fld>
             <a:endParaRPr lang="es-CO"/>
           </a:p>
@@ -3446,7 +3446,7 @@
           <a:p>
             <a:fld id="{BD986248-06F7-A441-A47A-264EBD310E11}" type="datetimeFigureOut">
               <a:rPr lang="es-CO" smtClean="0"/>
-              <a:t>5/08/2025</a:t>
+              <a:t>6/08/2025</a:t>
             </a:fld>
             <a:endParaRPr lang="es-CO"/>
           </a:p>
@@ -3689,7 +3689,7 @@
           <a:p>
             <a:fld id="{BD986248-06F7-A441-A47A-264EBD310E11}" type="datetimeFigureOut">
               <a:rPr lang="es-CO" smtClean="0"/>
-              <a:t>5/08/2025</a:t>
+              <a:t>6/08/2025</a:t>
             </a:fld>
             <a:endParaRPr lang="es-CO"/>
           </a:p>
@@ -7664,7 +7664,7 @@
         <p:spPr>
           <a:xfrm>
             <a:off x="456236" y="1822195"/>
-            <a:ext cx="11514091" cy="3785652"/>
+            <a:ext cx="11514091" cy="3046988"/>
           </a:xfrm>
           <a:prstGeom prst="rect">
             <a:avLst/>
@@ -7723,18 +7723,13 @@
             </a:pPr>
             <a:r>
               <a:rPr lang="es-MX" sz="2400" dirty="0"/>
-              <a:t>Evitar conflictos de horario en las reservas y mantener actualizados los inventarios de manera automática.</a:t>
-            </a:r>
-          </a:p>
-          <a:p>
-            <a:pPr marL="342900" lvl="0" indent="-342900">
-              <a:buFont typeface="Arial" panose="020B0604020202020204" pitchFamily="34" charset="0"/>
-              <a:buChar char="•"/>
-            </a:pPr>
-            <a:r>
-              <a:rPr lang="es-CO" sz="2400" dirty="0"/>
-              <a:t>Ejecutar operaciones como registrar reservas, agregar productos o calcular totales de forma rápida y eficiente</a:t>
-            </a:r>
+              <a:t>Evitar conflictos de horario en las reservas y mantener actualizados los inventarios de manera </a:t>
+            </a:r>
+            <a:r>
+              <a:rPr lang="es-MX" sz="2400"/>
+              <a:t>automática.</a:t>
+            </a:r>
+            <a:endParaRPr lang="es-MX" sz="2400" dirty="0"/>
           </a:p>
         </p:txBody>
       </p:sp>

</xml_diff>

<commit_message>
ajustes para evitar que se realicen mas de cinco reservas por usuario
</commit_message>
<xml_diff>
--- a/DIapositivas_Game_Time.pptx
+++ b/DIapositivas_Game_Time.pptx
@@ -249,7 +249,7 @@
           <a:p>
             <a:fld id="{88369B9F-131C-2846-AB8F-CEE154B4CAEB}" type="datetimeFigureOut">
               <a:rPr lang="es-CO" smtClean="0"/>
-              <a:t>6/08/2025</a:t>
+              <a:t>8/08/2025</a:t>
             </a:fld>
             <a:endParaRPr lang="es-CO"/>
           </a:p>
@@ -426,7 +426,7 @@
           <a:p>
             <a:fld id="{9660CB96-A603-FF42-AE46-F5F75F80A67B}" type="datetimeFigureOut">
               <a:rPr lang="es-CO" smtClean="0"/>
-              <a:t>6/08/2025</a:t>
+              <a:t>8/08/2025</a:t>
             </a:fld>
             <a:endParaRPr lang="es-CO"/>
           </a:p>
@@ -843,7 +843,7 @@
           <a:p>
             <a:fld id="{BD986248-06F7-A441-A47A-264EBD310E11}" type="datetimeFigureOut">
               <a:rPr lang="es-CO" smtClean="0"/>
-              <a:t>6/08/2025</a:t>
+              <a:t>8/08/2025</a:t>
             </a:fld>
             <a:endParaRPr lang="es-CO"/>
           </a:p>
@@ -1043,7 +1043,7 @@
           <a:p>
             <a:fld id="{BD986248-06F7-A441-A47A-264EBD310E11}" type="datetimeFigureOut">
               <a:rPr lang="es-CO" smtClean="0"/>
-              <a:t>6/08/2025</a:t>
+              <a:t>8/08/2025</a:t>
             </a:fld>
             <a:endParaRPr lang="es-CO"/>
           </a:p>
@@ -1253,7 +1253,7 @@
           <a:p>
             <a:fld id="{BD986248-06F7-A441-A47A-264EBD310E11}" type="datetimeFigureOut">
               <a:rPr lang="es-CO" smtClean="0"/>
-              <a:t>6/08/2025</a:t>
+              <a:t>8/08/2025</a:t>
             </a:fld>
             <a:endParaRPr lang="es-CO"/>
           </a:p>
@@ -1414,7 +1414,7 @@
           <a:p>
             <a:fld id="{BD986248-06F7-A441-A47A-264EBD310E11}" type="datetimeFigureOut">
               <a:rPr lang="es-CO" smtClean="0"/>
-              <a:t>6/08/2025</a:t>
+              <a:t>8/08/2025</a:t>
             </a:fld>
             <a:endParaRPr lang="es-CO"/>
           </a:p>
@@ -1614,7 +1614,7 @@
           <a:p>
             <a:fld id="{BD986248-06F7-A441-A47A-264EBD310E11}" type="datetimeFigureOut">
               <a:rPr lang="es-CO" smtClean="0"/>
-              <a:t>6/08/2025</a:t>
+              <a:t>8/08/2025</a:t>
             </a:fld>
             <a:endParaRPr lang="es-CO"/>
           </a:p>
@@ -1890,7 +1890,7 @@
           <a:p>
             <a:fld id="{BD986248-06F7-A441-A47A-264EBD310E11}" type="datetimeFigureOut">
               <a:rPr lang="es-CO" smtClean="0"/>
-              <a:t>6/08/2025</a:t>
+              <a:t>8/08/2025</a:t>
             </a:fld>
             <a:endParaRPr lang="es-CO"/>
           </a:p>
@@ -2158,7 +2158,7 @@
           <a:p>
             <a:fld id="{BD986248-06F7-A441-A47A-264EBD310E11}" type="datetimeFigureOut">
               <a:rPr lang="es-CO" smtClean="0"/>
-              <a:t>6/08/2025</a:t>
+              <a:t>8/08/2025</a:t>
             </a:fld>
             <a:endParaRPr lang="es-CO"/>
           </a:p>
@@ -2573,7 +2573,7 @@
           <a:p>
             <a:fld id="{BD986248-06F7-A441-A47A-264EBD310E11}" type="datetimeFigureOut">
               <a:rPr lang="es-CO" smtClean="0"/>
-              <a:t>6/08/2025</a:t>
+              <a:t>8/08/2025</a:t>
             </a:fld>
             <a:endParaRPr lang="es-CO"/>
           </a:p>
@@ -2715,7 +2715,7 @@
           <a:p>
             <a:fld id="{BD986248-06F7-A441-A47A-264EBD310E11}" type="datetimeFigureOut">
               <a:rPr lang="es-CO" smtClean="0"/>
-              <a:t>6/08/2025</a:t>
+              <a:t>8/08/2025</a:t>
             </a:fld>
             <a:endParaRPr lang="es-CO"/>
           </a:p>
@@ -2828,7 +2828,7 @@
           <a:p>
             <a:fld id="{BD986248-06F7-A441-A47A-264EBD310E11}" type="datetimeFigureOut">
               <a:rPr lang="es-CO" smtClean="0"/>
-              <a:t>6/08/2025</a:t>
+              <a:t>8/08/2025</a:t>
             </a:fld>
             <a:endParaRPr lang="es-CO"/>
           </a:p>
@@ -3157,7 +3157,7 @@
           <a:p>
             <a:fld id="{BD986248-06F7-A441-A47A-264EBD310E11}" type="datetimeFigureOut">
               <a:rPr lang="es-CO" smtClean="0"/>
-              <a:t>6/08/2025</a:t>
+              <a:t>8/08/2025</a:t>
             </a:fld>
             <a:endParaRPr lang="es-CO"/>
           </a:p>
@@ -3446,7 +3446,7 @@
           <a:p>
             <a:fld id="{BD986248-06F7-A441-A47A-264EBD310E11}" type="datetimeFigureOut">
               <a:rPr lang="es-CO" smtClean="0"/>
-              <a:t>6/08/2025</a:t>
+              <a:t>8/08/2025</a:t>
             </a:fld>
             <a:endParaRPr lang="es-CO"/>
           </a:p>
@@ -3689,7 +3689,7 @@
           <a:p>
             <a:fld id="{BD986248-06F7-A441-A47A-264EBD310E11}" type="datetimeFigureOut">
               <a:rPr lang="es-CO" smtClean="0"/>
-              <a:t>6/08/2025</a:t>
+              <a:t>8/08/2025</a:t>
             </a:fld>
             <a:endParaRPr lang="es-CO"/>
           </a:p>
@@ -8083,10 +8083,10 @@
       </p:sp>
       <p:pic>
         <p:nvPicPr>
-          <p:cNvPr id="5" name="Imagen 4" descr="Diagrama, Esquemático&#10;&#10;El contenido generado por IA puede ser incorrecto.">
-            <a:extLst>
-              <a:ext uri="{FF2B5EF4-FFF2-40B4-BE49-F238E27FC236}">
-                <a16:creationId xmlns:a16="http://schemas.microsoft.com/office/drawing/2014/main" id="{26203FE5-2605-8760-2E8C-06F467A18DB3}"/>
+          <p:cNvPr id="4" name="Imagen 3" descr="Diagrama&#10;&#10;El contenido generado por IA puede ser incorrecto.">
+            <a:extLst>
+              <a:ext uri="{FF2B5EF4-FFF2-40B4-BE49-F238E27FC236}">
+                <a16:creationId xmlns:a16="http://schemas.microsoft.com/office/drawing/2014/main" id="{59073834-15CA-A7F2-FFF1-026DB0DCC91F}"/>
               </a:ext>
             </a:extLst>
           </p:cNvPr>
@@ -8103,8 +8103,8 @@
         </p:blipFill>
         <p:spPr>
           <a:xfrm>
-            <a:off x="220709" y="1409074"/>
-            <a:ext cx="11971291" cy="5448925"/>
+            <a:off x="0" y="1343890"/>
+            <a:ext cx="12192000" cy="5514109"/>
           </a:xfrm>
           <a:prstGeom prst="rect">
             <a:avLst/>

</xml_diff>

<commit_message>
implementacion del token de refresco
</commit_message>
<xml_diff>
--- a/DIapositivas_Game_Time.pptx
+++ b/DIapositivas_Game_Time.pptx
@@ -5,10 +5,10 @@
     <p:sldMasterId id="2147483648" r:id="rId1"/>
   </p:sldMasterIdLst>
   <p:notesMasterIdLst>
-    <p:notesMasterId r:id="rId21"/>
+    <p:notesMasterId r:id="rId23"/>
   </p:notesMasterIdLst>
   <p:handoutMasterIdLst>
-    <p:handoutMasterId r:id="rId22"/>
+    <p:handoutMasterId r:id="rId24"/>
   </p:handoutMasterIdLst>
   <p:sldIdLst>
     <p:sldId id="538" r:id="rId2"/>
@@ -19,17 +19,19 @@
     <p:sldId id="547" r:id="rId7"/>
     <p:sldId id="548" r:id="rId8"/>
     <p:sldId id="549" r:id="rId9"/>
-    <p:sldId id="550" r:id="rId10"/>
-    <p:sldId id="551" r:id="rId11"/>
-    <p:sldId id="552" r:id="rId12"/>
-    <p:sldId id="553" r:id="rId13"/>
-    <p:sldId id="554" r:id="rId14"/>
-    <p:sldId id="555" r:id="rId15"/>
-    <p:sldId id="556" r:id="rId16"/>
-    <p:sldId id="557" r:id="rId17"/>
-    <p:sldId id="558" r:id="rId18"/>
-    <p:sldId id="559" r:id="rId19"/>
-    <p:sldId id="531" r:id="rId20"/>
+    <p:sldId id="560" r:id="rId10"/>
+    <p:sldId id="561" r:id="rId11"/>
+    <p:sldId id="550" r:id="rId12"/>
+    <p:sldId id="551" r:id="rId13"/>
+    <p:sldId id="552" r:id="rId14"/>
+    <p:sldId id="553" r:id="rId15"/>
+    <p:sldId id="554" r:id="rId16"/>
+    <p:sldId id="555" r:id="rId17"/>
+    <p:sldId id="556" r:id="rId18"/>
+    <p:sldId id="557" r:id="rId19"/>
+    <p:sldId id="558" r:id="rId20"/>
+    <p:sldId id="559" r:id="rId21"/>
+    <p:sldId id="531" r:id="rId22"/>
   </p:sldIdLst>
   <p:sldSz cx="12192000" cy="6858000"/>
   <p:notesSz cx="6858000" cy="9144000"/>
@@ -249,7 +251,7 @@
           <a:p>
             <a:fld id="{88369B9F-131C-2846-AB8F-CEE154B4CAEB}" type="datetimeFigureOut">
               <a:rPr lang="es-CO" smtClean="0"/>
-              <a:t>8/08/2025</a:t>
+              <a:t>17/08/2025</a:t>
             </a:fld>
             <a:endParaRPr lang="es-CO"/>
           </a:p>
@@ -426,7 +428,7 @@
           <a:p>
             <a:fld id="{9660CB96-A603-FF42-AE46-F5F75F80A67B}" type="datetimeFigureOut">
               <a:rPr lang="es-CO" smtClean="0"/>
-              <a:t>8/08/2025</a:t>
+              <a:t>17/08/2025</a:t>
             </a:fld>
             <a:endParaRPr lang="es-CO"/>
           </a:p>
@@ -843,7 +845,7 @@
           <a:p>
             <a:fld id="{BD986248-06F7-A441-A47A-264EBD310E11}" type="datetimeFigureOut">
               <a:rPr lang="es-CO" smtClean="0"/>
-              <a:t>8/08/2025</a:t>
+              <a:t>17/08/2025</a:t>
             </a:fld>
             <a:endParaRPr lang="es-CO"/>
           </a:p>
@@ -1043,7 +1045,7 @@
           <a:p>
             <a:fld id="{BD986248-06F7-A441-A47A-264EBD310E11}" type="datetimeFigureOut">
               <a:rPr lang="es-CO" smtClean="0"/>
-              <a:t>8/08/2025</a:t>
+              <a:t>17/08/2025</a:t>
             </a:fld>
             <a:endParaRPr lang="es-CO"/>
           </a:p>
@@ -1253,7 +1255,7 @@
           <a:p>
             <a:fld id="{BD986248-06F7-A441-A47A-264EBD310E11}" type="datetimeFigureOut">
               <a:rPr lang="es-CO" smtClean="0"/>
-              <a:t>8/08/2025</a:t>
+              <a:t>17/08/2025</a:t>
             </a:fld>
             <a:endParaRPr lang="es-CO"/>
           </a:p>
@@ -1414,7 +1416,7 @@
           <a:p>
             <a:fld id="{BD986248-06F7-A441-A47A-264EBD310E11}" type="datetimeFigureOut">
               <a:rPr lang="es-CO" smtClean="0"/>
-              <a:t>8/08/2025</a:t>
+              <a:t>17/08/2025</a:t>
             </a:fld>
             <a:endParaRPr lang="es-CO"/>
           </a:p>
@@ -1614,7 +1616,7 @@
           <a:p>
             <a:fld id="{BD986248-06F7-A441-A47A-264EBD310E11}" type="datetimeFigureOut">
               <a:rPr lang="es-CO" smtClean="0"/>
-              <a:t>8/08/2025</a:t>
+              <a:t>17/08/2025</a:t>
             </a:fld>
             <a:endParaRPr lang="es-CO"/>
           </a:p>
@@ -1890,7 +1892,7 @@
           <a:p>
             <a:fld id="{BD986248-06F7-A441-A47A-264EBD310E11}" type="datetimeFigureOut">
               <a:rPr lang="es-CO" smtClean="0"/>
-              <a:t>8/08/2025</a:t>
+              <a:t>17/08/2025</a:t>
             </a:fld>
             <a:endParaRPr lang="es-CO"/>
           </a:p>
@@ -2158,7 +2160,7 @@
           <a:p>
             <a:fld id="{BD986248-06F7-A441-A47A-264EBD310E11}" type="datetimeFigureOut">
               <a:rPr lang="es-CO" smtClean="0"/>
-              <a:t>8/08/2025</a:t>
+              <a:t>17/08/2025</a:t>
             </a:fld>
             <a:endParaRPr lang="es-CO"/>
           </a:p>
@@ -2573,7 +2575,7 @@
           <a:p>
             <a:fld id="{BD986248-06F7-A441-A47A-264EBD310E11}" type="datetimeFigureOut">
               <a:rPr lang="es-CO" smtClean="0"/>
-              <a:t>8/08/2025</a:t>
+              <a:t>17/08/2025</a:t>
             </a:fld>
             <a:endParaRPr lang="es-CO"/>
           </a:p>
@@ -2715,7 +2717,7 @@
           <a:p>
             <a:fld id="{BD986248-06F7-A441-A47A-264EBD310E11}" type="datetimeFigureOut">
               <a:rPr lang="es-CO" smtClean="0"/>
-              <a:t>8/08/2025</a:t>
+              <a:t>17/08/2025</a:t>
             </a:fld>
             <a:endParaRPr lang="es-CO"/>
           </a:p>
@@ -2828,7 +2830,7 @@
           <a:p>
             <a:fld id="{BD986248-06F7-A441-A47A-264EBD310E11}" type="datetimeFigureOut">
               <a:rPr lang="es-CO" smtClean="0"/>
-              <a:t>8/08/2025</a:t>
+              <a:t>17/08/2025</a:t>
             </a:fld>
             <a:endParaRPr lang="es-CO"/>
           </a:p>
@@ -3157,7 +3159,7 @@
           <a:p>
             <a:fld id="{BD986248-06F7-A441-A47A-264EBD310E11}" type="datetimeFigureOut">
               <a:rPr lang="es-CO" smtClean="0"/>
-              <a:t>8/08/2025</a:t>
+              <a:t>17/08/2025</a:t>
             </a:fld>
             <a:endParaRPr lang="es-CO"/>
           </a:p>
@@ -3446,7 +3448,7 @@
           <a:p>
             <a:fld id="{BD986248-06F7-A441-A47A-264EBD310E11}" type="datetimeFigureOut">
               <a:rPr lang="es-CO" smtClean="0"/>
-              <a:t>8/08/2025</a:t>
+              <a:t>17/08/2025</a:t>
             </a:fld>
             <a:endParaRPr lang="es-CO"/>
           </a:p>
@@ -3689,7 +3691,7 @@
           <a:p>
             <a:fld id="{BD986248-06F7-A441-A47A-264EBD310E11}" type="datetimeFigureOut">
               <a:rPr lang="es-CO" smtClean="0"/>
-              <a:t>8/08/2025</a:t>
+              <a:t>17/08/2025</a:t>
             </a:fld>
             <a:endParaRPr lang="es-CO"/>
           </a:p>
@@ -4310,6 +4312,384 @@
         <p:cNvPr id="1" name="">
           <a:extLst>
             <a:ext uri="{FF2B5EF4-FFF2-40B4-BE49-F238E27FC236}">
+              <a16:creationId xmlns:a16="http://schemas.microsoft.com/office/drawing/2014/main" id="{7509CBB3-2F6C-90C0-DF9B-5728E3D0490D}"/>
+            </a:ext>
+          </a:extLst>
+        </p:cNvPr>
+        <p:cNvGrpSpPr/>
+        <p:nvPr/>
+      </p:nvGrpSpPr>
+      <p:grpSpPr>
+        <a:xfrm>
+          <a:off x="0" y="0"/>
+          <a:ext cx="0" cy="0"/>
+          <a:chOff x="0" y="0"/>
+          <a:chExt cx="0" cy="0"/>
+        </a:xfrm>
+      </p:grpSpPr>
+      <p:sp>
+        <p:nvSpPr>
+          <p:cNvPr id="3" name="Título 1">
+            <a:extLst>
+              <a:ext uri="{FF2B5EF4-FFF2-40B4-BE49-F238E27FC236}">
+                <a16:creationId xmlns:a16="http://schemas.microsoft.com/office/drawing/2014/main" id="{1FE850CE-475D-1565-3F45-B3755CFB9703}"/>
+              </a:ext>
+            </a:extLst>
+          </p:cNvPr>
+          <p:cNvSpPr txBox="1">
+            <a:spLocks/>
+          </p:cNvSpPr>
+          <p:nvPr/>
+        </p:nvSpPr>
+        <p:spPr>
+          <a:xfrm>
+            <a:off x="456236" y="416690"/>
+            <a:ext cx="9815809" cy="527874"/>
+          </a:xfrm>
+          <a:prstGeom prst="rect">
+            <a:avLst/>
+          </a:prstGeom>
+        </p:spPr>
+        <p:txBody>
+          <a:bodyPr/>
+          <a:lstStyle>
+            <a:lvl1pPr algn="l" defTabSz="914400" rtl="0" eaLnBrk="1" latinLnBrk="0" hangingPunct="1">
+              <a:lnSpc>
+                <a:spcPct val="90000"/>
+              </a:lnSpc>
+              <a:spcBef>
+                <a:spcPct val="0"/>
+              </a:spcBef>
+              <a:buNone/>
+              <a:defRPr sz="4400" kern="1200">
+                <a:solidFill>
+                  <a:schemeClr val="tx1"/>
+                </a:solidFill>
+                <a:latin typeface="+mj-lt"/>
+                <a:ea typeface="+mj-ea"/>
+                <a:cs typeface="+mj-cs"/>
+              </a:defRPr>
+            </a:lvl1pPr>
+          </a:lstStyle>
+          <a:p>
+            <a:pPr marL="0" marR="0" lvl="0" indent="0" algn="l" defTabSz="914400" rtl="0" eaLnBrk="1" fontAlgn="auto" latinLnBrk="0" hangingPunct="1">
+              <a:lnSpc>
+                <a:spcPct val="90000"/>
+              </a:lnSpc>
+              <a:spcBef>
+                <a:spcPct val="0"/>
+              </a:spcBef>
+              <a:spcAft>
+                <a:spcPts val="0"/>
+              </a:spcAft>
+              <a:buClrTx/>
+              <a:buSzTx/>
+              <a:buFontTx/>
+              <a:buNone/>
+              <a:tabLst/>
+              <a:defRPr/>
+            </a:pPr>
+            <a:r>
+              <a:rPr kumimoji="0" lang="es-CO" sz="3600" b="1" u="none" strike="noStrike" kern="1200" cap="none" spc="0" normalizeH="0" baseline="0" noProof="0" dirty="0">
+                <a:ln>
+                  <a:noFill/>
+                </a:ln>
+                <a:solidFill>
+                  <a:prstClr val="white"/>
+                </a:solidFill>
+                <a:effectLst/>
+                <a:uLnTx/>
+                <a:uFillTx/>
+                <a:latin typeface="WORK SANS BOLD ROMAN" pitchFamily="2" charset="77"/>
+              </a:rPr>
+              <a:t>Diagrama de casos de uso (Nuevo)</a:t>
+            </a:r>
+          </a:p>
+          <a:p>
+            <a:pPr marL="0" marR="0" lvl="0" indent="0" algn="l" defTabSz="914400" rtl="0" eaLnBrk="1" fontAlgn="auto" latinLnBrk="0" hangingPunct="1">
+              <a:lnSpc>
+                <a:spcPct val="90000"/>
+              </a:lnSpc>
+              <a:spcBef>
+                <a:spcPct val="0"/>
+              </a:spcBef>
+              <a:spcAft>
+                <a:spcPts val="0"/>
+              </a:spcAft>
+              <a:buClrTx/>
+              <a:buSzTx/>
+              <a:buFontTx/>
+              <a:buNone/>
+              <a:tabLst/>
+              <a:defRPr/>
+            </a:pPr>
+            <a:endParaRPr kumimoji="0" lang="es-CO" sz="3600" b="1" u="none" strike="noStrike" kern="1200" cap="none" spc="0" normalizeH="0" baseline="0" noProof="0" dirty="0">
+              <a:ln>
+                <a:noFill/>
+              </a:ln>
+              <a:solidFill>
+                <a:prstClr val="white"/>
+              </a:solidFill>
+              <a:effectLst/>
+              <a:uLnTx/>
+              <a:uFillTx/>
+              <a:latin typeface="WORK SANS BOLD ROMAN" pitchFamily="2" charset="77"/>
+            </a:endParaRPr>
+          </a:p>
+        </p:txBody>
+      </p:sp>
+      <p:pic>
+        <p:nvPicPr>
+          <p:cNvPr id="5" name="Imagen 4" descr="Diagrama&#10;&#10;El contenido generado por IA puede ser incorrecto.">
+            <a:extLst>
+              <a:ext uri="{FF2B5EF4-FFF2-40B4-BE49-F238E27FC236}">
+                <a16:creationId xmlns:a16="http://schemas.microsoft.com/office/drawing/2014/main" id="{90E5997A-56C7-9044-86F3-701CD706FCF9}"/>
+              </a:ext>
+            </a:extLst>
+          </p:cNvPr>
+          <p:cNvPicPr>
+            <a:picLocks noChangeAspect="1"/>
+          </p:cNvPicPr>
+          <p:nvPr/>
+        </p:nvPicPr>
+        <p:blipFill>
+          <a:blip r:embed="rId3"/>
+          <a:stretch>
+            <a:fillRect/>
+          </a:stretch>
+        </p:blipFill>
+        <p:spPr>
+          <a:xfrm>
+            <a:off x="2533338" y="1283757"/>
+            <a:ext cx="6231394" cy="5377463"/>
+          </a:xfrm>
+          <a:prstGeom prst="rect">
+            <a:avLst/>
+          </a:prstGeom>
+        </p:spPr>
+      </p:pic>
+    </p:spTree>
+    <p:extLst>
+      <p:ext uri="{BB962C8B-B14F-4D97-AF65-F5344CB8AC3E}">
+        <p14:creationId xmlns:p14="http://schemas.microsoft.com/office/powerpoint/2010/main" val="512407298"/>
+      </p:ext>
+    </p:extLst>
+  </p:cSld>
+  <p:clrMapOvr>
+    <a:masterClrMapping/>
+  </p:clrMapOvr>
+</p:sld>
+</file>
+
+<file path=ppt/slides/slide11.xml><?xml version="1.0" encoding="utf-8"?>
+<p:sld xmlns:a="http://schemas.openxmlformats.org/drawingml/2006/main" xmlns:r="http://schemas.openxmlformats.org/officeDocument/2006/relationships" xmlns:p="http://schemas.openxmlformats.org/presentationml/2006/main">
+  <p:cSld>
+    <p:bg>
+      <p:bgPr>
+        <a:blipFill dpi="0" rotWithShape="1">
+          <a:blip r:embed="rId2">
+            <a:lum/>
+          </a:blip>
+          <a:srcRect/>
+          <a:stretch>
+            <a:fillRect/>
+          </a:stretch>
+        </a:blipFill>
+        <a:effectLst/>
+      </p:bgPr>
+    </p:bg>
+    <p:spTree>
+      <p:nvGrpSpPr>
+        <p:cNvPr id="1" name="">
+          <a:extLst>
+            <a:ext uri="{FF2B5EF4-FFF2-40B4-BE49-F238E27FC236}">
+              <a16:creationId xmlns:a16="http://schemas.microsoft.com/office/drawing/2014/main" id="{21584517-E292-C05C-CC4D-08F1EBC91077}"/>
+            </a:ext>
+          </a:extLst>
+        </p:cNvPr>
+        <p:cNvGrpSpPr/>
+        <p:nvPr/>
+      </p:nvGrpSpPr>
+      <p:grpSpPr>
+        <a:xfrm>
+          <a:off x="0" y="0"/>
+          <a:ext cx="0" cy="0"/>
+          <a:chOff x="0" y="0"/>
+          <a:chExt cx="0" cy="0"/>
+        </a:xfrm>
+      </p:grpSpPr>
+      <p:sp>
+        <p:nvSpPr>
+          <p:cNvPr id="3" name="Título 1">
+            <a:extLst>
+              <a:ext uri="{FF2B5EF4-FFF2-40B4-BE49-F238E27FC236}">
+                <a16:creationId xmlns:a16="http://schemas.microsoft.com/office/drawing/2014/main" id="{8DD53E92-33A1-FC66-3137-93B49C727B45}"/>
+              </a:ext>
+            </a:extLst>
+          </p:cNvPr>
+          <p:cNvSpPr txBox="1">
+            <a:spLocks/>
+          </p:cNvSpPr>
+          <p:nvPr/>
+        </p:nvSpPr>
+        <p:spPr>
+          <a:xfrm>
+            <a:off x="456236" y="416690"/>
+            <a:ext cx="9815809" cy="527874"/>
+          </a:xfrm>
+          <a:prstGeom prst="rect">
+            <a:avLst/>
+          </a:prstGeom>
+        </p:spPr>
+        <p:txBody>
+          <a:bodyPr/>
+          <a:lstStyle>
+            <a:lvl1pPr algn="l" defTabSz="914400" rtl="0" eaLnBrk="1" latinLnBrk="0" hangingPunct="1">
+              <a:lnSpc>
+                <a:spcPct val="90000"/>
+              </a:lnSpc>
+              <a:spcBef>
+                <a:spcPct val="0"/>
+              </a:spcBef>
+              <a:buNone/>
+              <a:defRPr sz="4400" kern="1200">
+                <a:solidFill>
+                  <a:schemeClr val="tx1"/>
+                </a:solidFill>
+                <a:latin typeface="+mj-lt"/>
+                <a:ea typeface="+mj-ea"/>
+                <a:cs typeface="+mj-cs"/>
+              </a:defRPr>
+            </a:lvl1pPr>
+          </a:lstStyle>
+          <a:p>
+            <a:pPr marL="0" marR="0" lvl="0" indent="0" algn="l" defTabSz="914400" rtl="0" eaLnBrk="1" fontAlgn="auto" latinLnBrk="0" hangingPunct="1">
+              <a:lnSpc>
+                <a:spcPct val="90000"/>
+              </a:lnSpc>
+              <a:spcBef>
+                <a:spcPct val="0"/>
+              </a:spcBef>
+              <a:spcAft>
+                <a:spcPts val="0"/>
+              </a:spcAft>
+              <a:buClrTx/>
+              <a:buSzTx/>
+              <a:buFontTx/>
+              <a:buNone/>
+              <a:tabLst/>
+              <a:defRPr/>
+            </a:pPr>
+            <a:r>
+              <a:rPr kumimoji="0" lang="es-MX" sz="3600" b="1" u="none" strike="noStrike" kern="1200" cap="none" spc="0" normalizeH="0" baseline="0" noProof="0" dirty="0">
+                <a:ln>
+                  <a:noFill/>
+                </a:ln>
+                <a:solidFill>
+                  <a:prstClr val="white"/>
+                </a:solidFill>
+                <a:effectLst/>
+                <a:uLnTx/>
+                <a:uFillTx/>
+                <a:latin typeface="WORK SANS BOLD ROMAN" pitchFamily="2" charset="77"/>
+              </a:rPr>
+              <a:t>Diagrama entidad </a:t>
+            </a:r>
+            <a:r>
+              <a:rPr kumimoji="0" lang="es-MX" sz="3600" b="1" u="none" strike="noStrike" kern="1200" cap="none" spc="0" normalizeH="0" baseline="0" noProof="0" dirty="0" err="1">
+                <a:ln>
+                  <a:noFill/>
+                </a:ln>
+                <a:solidFill>
+                  <a:prstClr val="white"/>
+                </a:solidFill>
+                <a:effectLst/>
+                <a:uLnTx/>
+                <a:uFillTx/>
+                <a:latin typeface="WORK SANS BOLD ROMAN" pitchFamily="2" charset="77"/>
+              </a:rPr>
+              <a:t>relacion</a:t>
+            </a:r>
+            <a:endParaRPr kumimoji="0" lang="es-CO" sz="3600" b="1" u="none" strike="noStrike" kern="1200" cap="none" spc="0" normalizeH="0" baseline="0" noProof="0" dirty="0">
+              <a:ln>
+                <a:noFill/>
+              </a:ln>
+              <a:solidFill>
+                <a:prstClr val="white"/>
+              </a:solidFill>
+              <a:effectLst/>
+              <a:uLnTx/>
+              <a:uFillTx/>
+              <a:latin typeface="WORK SANS BOLD ROMAN" pitchFamily="2" charset="77"/>
+            </a:endParaRPr>
+          </a:p>
+        </p:txBody>
+      </p:sp>
+      <p:pic>
+        <p:nvPicPr>
+          <p:cNvPr id="4" name="Imagen 3" descr="Diagrama&#10;&#10;El contenido generado por IA puede ser incorrecto.">
+            <a:extLst>
+              <a:ext uri="{FF2B5EF4-FFF2-40B4-BE49-F238E27FC236}">
+                <a16:creationId xmlns:a16="http://schemas.microsoft.com/office/drawing/2014/main" id="{59073834-15CA-A7F2-FFF1-026DB0DCC91F}"/>
+              </a:ext>
+            </a:extLst>
+          </p:cNvPr>
+          <p:cNvPicPr>
+            <a:picLocks noChangeAspect="1"/>
+          </p:cNvPicPr>
+          <p:nvPr/>
+        </p:nvPicPr>
+        <p:blipFill>
+          <a:blip r:embed="rId3"/>
+          <a:stretch>
+            <a:fillRect/>
+          </a:stretch>
+        </p:blipFill>
+        <p:spPr>
+          <a:xfrm>
+            <a:off x="0" y="1343890"/>
+            <a:ext cx="12192000" cy="5514109"/>
+          </a:xfrm>
+          <a:prstGeom prst="rect">
+            <a:avLst/>
+          </a:prstGeom>
+        </p:spPr>
+      </p:pic>
+    </p:spTree>
+    <p:extLst>
+      <p:ext uri="{BB962C8B-B14F-4D97-AF65-F5344CB8AC3E}">
+        <p14:creationId xmlns:p14="http://schemas.microsoft.com/office/powerpoint/2010/main" val="593768045"/>
+      </p:ext>
+    </p:extLst>
+  </p:cSld>
+  <p:clrMapOvr>
+    <a:masterClrMapping/>
+  </p:clrMapOvr>
+</p:sld>
+</file>
+
+<file path=ppt/slides/slide12.xml><?xml version="1.0" encoding="utf-8"?>
+<p:sld xmlns:a="http://schemas.openxmlformats.org/drawingml/2006/main" xmlns:r="http://schemas.openxmlformats.org/officeDocument/2006/relationships" xmlns:p="http://schemas.openxmlformats.org/presentationml/2006/main">
+  <p:cSld>
+    <p:bg>
+      <p:bgPr>
+        <a:blipFill dpi="0" rotWithShape="1">
+          <a:blip r:embed="rId2">
+            <a:lum/>
+          </a:blip>
+          <a:srcRect/>
+          <a:stretch>
+            <a:fillRect/>
+          </a:stretch>
+        </a:blipFill>
+        <a:effectLst/>
+      </p:bgPr>
+    </p:bg>
+    <p:spTree>
+      <p:nvGrpSpPr>
+        <p:cNvPr id="1" name="">
+          <a:extLst>
+            <a:ext uri="{FF2B5EF4-FFF2-40B4-BE49-F238E27FC236}">
               <a16:creationId xmlns:a16="http://schemas.microsoft.com/office/drawing/2014/main" id="{FAED764F-22E2-B032-7A84-122750F6D69F}"/>
             </a:ext>
           </a:extLst>
@@ -4519,7 +4899,7 @@
 </p:sld>
 </file>
 
-<file path=ppt/slides/slide11.xml><?xml version="1.0" encoding="utf-8"?>
+<file path=ppt/slides/slide13.xml><?xml version="1.0" encoding="utf-8"?>
 <p:sld xmlns:a="http://schemas.openxmlformats.org/drawingml/2006/main" xmlns:r="http://schemas.openxmlformats.org/officeDocument/2006/relationships" xmlns:p="http://schemas.openxmlformats.org/presentationml/2006/main">
   <p:cSld>
     <p:bg>
@@ -4750,7 +5130,7 @@
 </p:sld>
 </file>
 
-<file path=ppt/slides/slide12.xml><?xml version="1.0" encoding="utf-8"?>
+<file path=ppt/slides/slide14.xml><?xml version="1.0" encoding="utf-8"?>
 <p:sld xmlns:a="http://schemas.openxmlformats.org/drawingml/2006/main" xmlns:r="http://schemas.openxmlformats.org/officeDocument/2006/relationships" xmlns:p="http://schemas.openxmlformats.org/presentationml/2006/main">
   <p:cSld>
     <p:bg>
@@ -4989,7 +5369,7 @@
 </p:sld>
 </file>
 
-<file path=ppt/slides/slide13.xml><?xml version="1.0" encoding="utf-8"?>
+<file path=ppt/slides/slide15.xml><?xml version="1.0" encoding="utf-8"?>
 <p:sld xmlns:a="http://schemas.openxmlformats.org/drawingml/2006/main" xmlns:r="http://schemas.openxmlformats.org/officeDocument/2006/relationships" xmlns:p="http://schemas.openxmlformats.org/presentationml/2006/main">
   <p:cSld>
     <p:bg>
@@ -5239,7 +5619,7 @@
 </p:sld>
 </file>
 
-<file path=ppt/slides/slide14.xml><?xml version="1.0" encoding="utf-8"?>
+<file path=ppt/slides/slide16.xml><?xml version="1.0" encoding="utf-8"?>
 <p:sld xmlns:a="http://schemas.openxmlformats.org/drawingml/2006/main" xmlns:r="http://schemas.openxmlformats.org/officeDocument/2006/relationships" xmlns:p="http://schemas.openxmlformats.org/presentationml/2006/main">
   <p:cSld>
     <p:bg>
@@ -5499,7 +5879,7 @@
 </p:sld>
 </file>
 
-<file path=ppt/slides/slide15.xml><?xml version="1.0" encoding="utf-8"?>
+<file path=ppt/slides/slide17.xml><?xml version="1.0" encoding="utf-8"?>
 <p:sld xmlns:a="http://schemas.openxmlformats.org/drawingml/2006/main" xmlns:r="http://schemas.openxmlformats.org/officeDocument/2006/relationships" xmlns:p="http://schemas.openxmlformats.org/presentationml/2006/main">
   <p:cSld>
     <p:bg>
@@ -5741,7 +6121,7 @@
 </p:sld>
 </file>
 
-<file path=ppt/slides/slide16.xml><?xml version="1.0" encoding="utf-8"?>
+<file path=ppt/slides/slide18.xml><?xml version="1.0" encoding="utf-8"?>
 <p:sld xmlns:a="http://schemas.openxmlformats.org/drawingml/2006/main" xmlns:r="http://schemas.openxmlformats.org/officeDocument/2006/relationships" xmlns:p="http://schemas.openxmlformats.org/presentationml/2006/main">
   <p:cSld>
     <p:bg>
@@ -5962,7 +6342,7 @@
 </p:sld>
 </file>
 
-<file path=ppt/slides/slide17.xml><?xml version="1.0" encoding="utf-8"?>
+<file path=ppt/slides/slide19.xml><?xml version="1.0" encoding="utf-8"?>
 <p:sld xmlns:a="http://schemas.openxmlformats.org/drawingml/2006/main" xmlns:r="http://schemas.openxmlformats.org/officeDocument/2006/relationships" xmlns:p="http://schemas.openxmlformats.org/presentationml/2006/main">
   <p:cSld>
     <p:bg>
@@ -6201,306 +6581,6 @@
     <p:extLst>
       <p:ext uri="{BB962C8B-B14F-4D97-AF65-F5344CB8AC3E}">
         <p14:creationId xmlns:p14="http://schemas.microsoft.com/office/powerpoint/2010/main" val="3749338099"/>
-      </p:ext>
-    </p:extLst>
-  </p:cSld>
-  <p:clrMapOvr>
-    <a:masterClrMapping/>
-  </p:clrMapOvr>
-</p:sld>
-</file>
-
-<file path=ppt/slides/slide18.xml><?xml version="1.0" encoding="utf-8"?>
-<p:sld xmlns:a="http://schemas.openxmlformats.org/drawingml/2006/main" xmlns:r="http://schemas.openxmlformats.org/officeDocument/2006/relationships" xmlns:p="http://schemas.openxmlformats.org/presentationml/2006/main">
-  <p:cSld>
-    <p:bg>
-      <p:bgPr>
-        <a:blipFill dpi="0" rotWithShape="1">
-          <a:blip r:embed="rId2">
-            <a:lum/>
-          </a:blip>
-          <a:srcRect/>
-          <a:stretch>
-            <a:fillRect/>
-          </a:stretch>
-        </a:blipFill>
-        <a:effectLst/>
-      </p:bgPr>
-    </p:bg>
-    <p:spTree>
-      <p:nvGrpSpPr>
-        <p:cNvPr id="1" name="">
-          <a:extLst>
-            <a:ext uri="{FF2B5EF4-FFF2-40B4-BE49-F238E27FC236}">
-              <a16:creationId xmlns:a16="http://schemas.microsoft.com/office/drawing/2014/main" id="{A69C2F71-2811-1FEC-18BE-008CBAA1A25F}"/>
-            </a:ext>
-          </a:extLst>
-        </p:cNvPr>
-        <p:cNvGrpSpPr/>
-        <p:nvPr/>
-      </p:nvGrpSpPr>
-      <p:grpSpPr>
-        <a:xfrm>
-          <a:off x="0" y="0"/>
-          <a:ext cx="0" cy="0"/>
-          <a:chOff x="0" y="0"/>
-          <a:chExt cx="0" cy="0"/>
-        </a:xfrm>
-      </p:grpSpPr>
-      <p:sp>
-        <p:nvSpPr>
-          <p:cNvPr id="3" name="Título 1">
-            <a:extLst>
-              <a:ext uri="{FF2B5EF4-FFF2-40B4-BE49-F238E27FC236}">
-                <a16:creationId xmlns:a16="http://schemas.microsoft.com/office/drawing/2014/main" id="{0D4350B3-E1D5-7052-1899-DA1BA0C5580E}"/>
-              </a:ext>
-            </a:extLst>
-          </p:cNvPr>
-          <p:cNvSpPr txBox="1">
-            <a:spLocks/>
-          </p:cNvSpPr>
-          <p:nvPr/>
-        </p:nvSpPr>
-        <p:spPr>
-          <a:xfrm>
-            <a:off x="456236" y="416690"/>
-            <a:ext cx="9815809" cy="527874"/>
-          </a:xfrm>
-          <a:prstGeom prst="rect">
-            <a:avLst/>
-          </a:prstGeom>
-        </p:spPr>
-        <p:txBody>
-          <a:bodyPr/>
-          <a:lstStyle>
-            <a:lvl1pPr algn="l" defTabSz="914400" rtl="0" eaLnBrk="1" latinLnBrk="0" hangingPunct="1">
-              <a:lnSpc>
-                <a:spcPct val="90000"/>
-              </a:lnSpc>
-              <a:spcBef>
-                <a:spcPct val="0"/>
-              </a:spcBef>
-              <a:buNone/>
-              <a:defRPr sz="4400" kern="1200">
-                <a:solidFill>
-                  <a:schemeClr val="tx1"/>
-                </a:solidFill>
-                <a:latin typeface="+mj-lt"/>
-                <a:ea typeface="+mj-ea"/>
-                <a:cs typeface="+mj-cs"/>
-              </a:defRPr>
-            </a:lvl1pPr>
-          </a:lstStyle>
-          <a:p>
-            <a:pPr marL="0" marR="0" lvl="0" indent="0" algn="l" defTabSz="914400" rtl="0" eaLnBrk="1" fontAlgn="auto" latinLnBrk="0" hangingPunct="1">
-              <a:lnSpc>
-                <a:spcPct val="90000"/>
-              </a:lnSpc>
-              <a:spcBef>
-                <a:spcPct val="0"/>
-              </a:spcBef>
-              <a:spcAft>
-                <a:spcPts val="0"/>
-              </a:spcAft>
-              <a:buClrTx/>
-              <a:buSzTx/>
-              <a:buFontTx/>
-              <a:buNone/>
-              <a:tabLst/>
-              <a:defRPr/>
-            </a:pPr>
-            <a:r>
-              <a:rPr kumimoji="0" lang="es-CO" sz="3600" b="1" u="none" strike="noStrike" kern="1200" cap="none" spc="0" normalizeH="0" baseline="0" noProof="0" dirty="0">
-                <a:ln>
-                  <a:noFill/>
-                </a:ln>
-                <a:solidFill>
-                  <a:prstClr val="white"/>
-                </a:solidFill>
-                <a:effectLst/>
-                <a:uLnTx/>
-                <a:uFillTx/>
-                <a:latin typeface="WORK SANS BOLD ROMAN" pitchFamily="2" charset="77"/>
-              </a:rPr>
-              <a:t>Funcionamiento del aplicativo</a:t>
-            </a:r>
-          </a:p>
-          <a:p>
-            <a:pPr marL="0" marR="0" lvl="0" indent="0" algn="l" defTabSz="914400" rtl="0" eaLnBrk="1" fontAlgn="auto" latinLnBrk="0" hangingPunct="1">
-              <a:lnSpc>
-                <a:spcPct val="90000"/>
-              </a:lnSpc>
-              <a:spcBef>
-                <a:spcPct val="0"/>
-              </a:spcBef>
-              <a:spcAft>
-                <a:spcPts val="0"/>
-              </a:spcAft>
-              <a:buClrTx/>
-              <a:buSzTx/>
-              <a:buFontTx/>
-              <a:buNone/>
-              <a:tabLst/>
-              <a:defRPr/>
-            </a:pPr>
-            <a:endParaRPr kumimoji="0" lang="es-CO" sz="3600" b="1" u="none" strike="noStrike" kern="1200" cap="none" spc="0" normalizeH="0" baseline="0" noProof="0" dirty="0">
-              <a:ln>
-                <a:noFill/>
-              </a:ln>
-              <a:solidFill>
-                <a:prstClr val="white"/>
-              </a:solidFill>
-              <a:effectLst/>
-              <a:uLnTx/>
-              <a:uFillTx/>
-              <a:latin typeface="WORK SANS BOLD ROMAN" pitchFamily="2" charset="77"/>
-            </a:endParaRPr>
-          </a:p>
-        </p:txBody>
-      </p:sp>
-      <p:sp>
-        <p:nvSpPr>
-          <p:cNvPr id="4" name="CuadroTexto 3">
-            <a:extLst>
-              <a:ext uri="{FF2B5EF4-FFF2-40B4-BE49-F238E27FC236}">
-                <a16:creationId xmlns:a16="http://schemas.microsoft.com/office/drawing/2014/main" id="{D5FCAEE8-76B3-C0F8-92B3-35325F5E78AB}"/>
-              </a:ext>
-            </a:extLst>
-          </p:cNvPr>
-          <p:cNvSpPr txBox="1"/>
-          <p:nvPr/>
-        </p:nvSpPr>
-        <p:spPr>
-          <a:xfrm>
-            <a:off x="456236" y="1318022"/>
-            <a:ext cx="11223145" cy="4801314"/>
-          </a:xfrm>
-          <a:prstGeom prst="rect">
-            <a:avLst/>
-          </a:prstGeom>
-          <a:noFill/>
-        </p:spPr>
-        <p:txBody>
-          <a:bodyPr wrap="square" rtlCol="0">
-            <a:spAutoFit/>
-          </a:bodyPr>
-          <a:lstStyle/>
-          <a:p>
-            <a:r>
-              <a:rPr lang="es-CO" sz="2400" b="1" dirty="0"/>
-              <a:t>HISTORIAL:</a:t>
-            </a:r>
-            <a:br>
-              <a:rPr lang="es-CO" sz="2400" dirty="0"/>
-            </a:br>
-            <a:r>
-              <a:rPr lang="es-CO" sz="2400" dirty="0"/>
-              <a:t>Esta vista estará disponible únicamente para los usuarios que cuenten con el rol de administrador. Aquí se podrán ver todas las reservas que ya se encuentran en estado "Pagada". También se mostrará el total que se ha pagado por cada uno de los métodos de pago disponibles.</a:t>
-            </a:r>
-          </a:p>
-          <a:p>
-            <a:pPr marL="342900" lvl="0" indent="-342900">
-              <a:buFont typeface="Arial" panose="020B0604020202020204" pitchFamily="34" charset="0"/>
-              <a:buChar char="•"/>
-            </a:pPr>
-            <a:r>
-              <a:rPr lang="es-CO" sz="2400" b="1" dirty="0"/>
-              <a:t>Filtrar: </a:t>
-            </a:r>
-            <a:r>
-              <a:rPr lang="es-CO" sz="2400" dirty="0"/>
-              <a:t>Aquí se podrá seleccionar el método de pago por el cual se desea filtrar. Dependiendo del método de pago seleccionado, se mostrarán todas las reservas pagadas con dicho método, junto con el total acumulado correspondiente.</a:t>
-            </a:r>
-          </a:p>
-          <a:p>
-            <a:pPr marL="342900" lvl="0" indent="-342900">
-              <a:buFont typeface="Arial" panose="020B0604020202020204" pitchFamily="34" charset="0"/>
-              <a:buChar char="•"/>
-            </a:pPr>
-            <a:r>
-              <a:rPr lang="es-CO" sz="2400" b="1" dirty="0"/>
-              <a:t>Total: </a:t>
-            </a:r>
-            <a:r>
-              <a:rPr lang="es-CO" sz="2400" dirty="0"/>
-              <a:t>Aquí se mostrará el total que se ha pagado por el método de pago seleccionado en el filtro.</a:t>
-            </a:r>
-          </a:p>
-          <a:p>
-            <a:pPr marL="342900" lvl="0" indent="-342900">
-              <a:buFont typeface="Arial" panose="020B0604020202020204" pitchFamily="34" charset="0"/>
-              <a:buChar char="•"/>
-            </a:pPr>
-            <a:r>
-              <a:rPr lang="es-CO" sz="2400" b="1" dirty="0"/>
-              <a:t>Botón </a:t>
-            </a:r>
-            <a:r>
-              <a:rPr lang="es-CO" sz="2400" b="1" dirty="0" err="1"/>
-              <a:t>Info</a:t>
-            </a:r>
-            <a:r>
-              <a:rPr lang="es-CO" sz="2400" b="1" dirty="0"/>
-              <a:t>: </a:t>
-            </a:r>
-            <a:r>
-              <a:rPr lang="es-CO" sz="2400" dirty="0"/>
-              <a:t>Al hacer clic en este botón se mostrará la información detallada acerca de la reserva, incluyendo los productos consumidos y el detalle de lo que se pagó.</a:t>
-            </a:r>
-          </a:p>
-          <a:p>
-            <a:endParaRPr lang="es-CO" dirty="0"/>
-          </a:p>
-        </p:txBody>
-      </p:sp>
-    </p:spTree>
-    <p:extLst>
-      <p:ext uri="{BB962C8B-B14F-4D97-AF65-F5344CB8AC3E}">
-        <p14:creationId xmlns:p14="http://schemas.microsoft.com/office/powerpoint/2010/main" val="2133519256"/>
-      </p:ext>
-    </p:extLst>
-  </p:cSld>
-  <p:clrMapOvr>
-    <a:masterClrMapping/>
-  </p:clrMapOvr>
-</p:sld>
-</file>
-
-<file path=ppt/slides/slide19.xml><?xml version="1.0" encoding="utf-8"?>
-<p:sld xmlns:a="http://schemas.openxmlformats.org/drawingml/2006/main" xmlns:r="http://schemas.openxmlformats.org/officeDocument/2006/relationships" xmlns:p="http://schemas.openxmlformats.org/presentationml/2006/main">
-  <p:cSld>
-    <p:bg>
-      <p:bgPr>
-        <a:blipFill dpi="0" rotWithShape="1">
-          <a:blip r:embed="rId2">
-            <a:lum/>
-          </a:blip>
-          <a:srcRect/>
-          <a:stretch>
-            <a:fillRect/>
-          </a:stretch>
-        </a:blipFill>
-        <a:effectLst/>
-      </p:bgPr>
-    </p:bg>
-    <p:spTree>
-      <p:nvGrpSpPr>
-        <p:cNvPr id="1" name=""/>
-        <p:cNvGrpSpPr/>
-        <p:nvPr/>
-      </p:nvGrpSpPr>
-      <p:grpSpPr>
-        <a:xfrm>
-          <a:off x="0" y="0"/>
-          <a:ext cx="0" cy="0"/>
-          <a:chOff x="0" y="0"/>
-          <a:chExt cx="0" cy="0"/>
-        </a:xfrm>
-      </p:grpSpPr>
-    </p:spTree>
-    <p:extLst>
-      <p:ext uri="{BB962C8B-B14F-4D97-AF65-F5344CB8AC3E}">
-        <p14:creationId xmlns:p14="http://schemas.microsoft.com/office/powerpoint/2010/main" val="2604626685"/>
       </p:ext>
     </p:extLst>
   </p:cSld>
@@ -6663,6 +6743,306 @@
     <p:extLst>
       <p:ext uri="{BB962C8B-B14F-4D97-AF65-F5344CB8AC3E}">
         <p14:creationId xmlns:p14="http://schemas.microsoft.com/office/powerpoint/2010/main" val="2269292441"/>
+      </p:ext>
+    </p:extLst>
+  </p:cSld>
+  <p:clrMapOvr>
+    <a:masterClrMapping/>
+  </p:clrMapOvr>
+</p:sld>
+</file>
+
+<file path=ppt/slides/slide20.xml><?xml version="1.0" encoding="utf-8"?>
+<p:sld xmlns:a="http://schemas.openxmlformats.org/drawingml/2006/main" xmlns:r="http://schemas.openxmlformats.org/officeDocument/2006/relationships" xmlns:p="http://schemas.openxmlformats.org/presentationml/2006/main">
+  <p:cSld>
+    <p:bg>
+      <p:bgPr>
+        <a:blipFill dpi="0" rotWithShape="1">
+          <a:blip r:embed="rId2">
+            <a:lum/>
+          </a:blip>
+          <a:srcRect/>
+          <a:stretch>
+            <a:fillRect/>
+          </a:stretch>
+        </a:blipFill>
+        <a:effectLst/>
+      </p:bgPr>
+    </p:bg>
+    <p:spTree>
+      <p:nvGrpSpPr>
+        <p:cNvPr id="1" name="">
+          <a:extLst>
+            <a:ext uri="{FF2B5EF4-FFF2-40B4-BE49-F238E27FC236}">
+              <a16:creationId xmlns:a16="http://schemas.microsoft.com/office/drawing/2014/main" id="{A69C2F71-2811-1FEC-18BE-008CBAA1A25F}"/>
+            </a:ext>
+          </a:extLst>
+        </p:cNvPr>
+        <p:cNvGrpSpPr/>
+        <p:nvPr/>
+      </p:nvGrpSpPr>
+      <p:grpSpPr>
+        <a:xfrm>
+          <a:off x="0" y="0"/>
+          <a:ext cx="0" cy="0"/>
+          <a:chOff x="0" y="0"/>
+          <a:chExt cx="0" cy="0"/>
+        </a:xfrm>
+      </p:grpSpPr>
+      <p:sp>
+        <p:nvSpPr>
+          <p:cNvPr id="3" name="Título 1">
+            <a:extLst>
+              <a:ext uri="{FF2B5EF4-FFF2-40B4-BE49-F238E27FC236}">
+                <a16:creationId xmlns:a16="http://schemas.microsoft.com/office/drawing/2014/main" id="{0D4350B3-E1D5-7052-1899-DA1BA0C5580E}"/>
+              </a:ext>
+            </a:extLst>
+          </p:cNvPr>
+          <p:cNvSpPr txBox="1">
+            <a:spLocks/>
+          </p:cNvSpPr>
+          <p:nvPr/>
+        </p:nvSpPr>
+        <p:spPr>
+          <a:xfrm>
+            <a:off x="456236" y="416690"/>
+            <a:ext cx="9815809" cy="527874"/>
+          </a:xfrm>
+          <a:prstGeom prst="rect">
+            <a:avLst/>
+          </a:prstGeom>
+        </p:spPr>
+        <p:txBody>
+          <a:bodyPr/>
+          <a:lstStyle>
+            <a:lvl1pPr algn="l" defTabSz="914400" rtl="0" eaLnBrk="1" latinLnBrk="0" hangingPunct="1">
+              <a:lnSpc>
+                <a:spcPct val="90000"/>
+              </a:lnSpc>
+              <a:spcBef>
+                <a:spcPct val="0"/>
+              </a:spcBef>
+              <a:buNone/>
+              <a:defRPr sz="4400" kern="1200">
+                <a:solidFill>
+                  <a:schemeClr val="tx1"/>
+                </a:solidFill>
+                <a:latin typeface="+mj-lt"/>
+                <a:ea typeface="+mj-ea"/>
+                <a:cs typeface="+mj-cs"/>
+              </a:defRPr>
+            </a:lvl1pPr>
+          </a:lstStyle>
+          <a:p>
+            <a:pPr marL="0" marR="0" lvl="0" indent="0" algn="l" defTabSz="914400" rtl="0" eaLnBrk="1" fontAlgn="auto" latinLnBrk="0" hangingPunct="1">
+              <a:lnSpc>
+                <a:spcPct val="90000"/>
+              </a:lnSpc>
+              <a:spcBef>
+                <a:spcPct val="0"/>
+              </a:spcBef>
+              <a:spcAft>
+                <a:spcPts val="0"/>
+              </a:spcAft>
+              <a:buClrTx/>
+              <a:buSzTx/>
+              <a:buFontTx/>
+              <a:buNone/>
+              <a:tabLst/>
+              <a:defRPr/>
+            </a:pPr>
+            <a:r>
+              <a:rPr kumimoji="0" lang="es-CO" sz="3600" b="1" u="none" strike="noStrike" kern="1200" cap="none" spc="0" normalizeH="0" baseline="0" noProof="0" dirty="0">
+                <a:ln>
+                  <a:noFill/>
+                </a:ln>
+                <a:solidFill>
+                  <a:prstClr val="white"/>
+                </a:solidFill>
+                <a:effectLst/>
+                <a:uLnTx/>
+                <a:uFillTx/>
+                <a:latin typeface="WORK SANS BOLD ROMAN" pitchFamily="2" charset="77"/>
+              </a:rPr>
+              <a:t>Funcionamiento del aplicativo</a:t>
+            </a:r>
+          </a:p>
+          <a:p>
+            <a:pPr marL="0" marR="0" lvl="0" indent="0" algn="l" defTabSz="914400" rtl="0" eaLnBrk="1" fontAlgn="auto" latinLnBrk="0" hangingPunct="1">
+              <a:lnSpc>
+                <a:spcPct val="90000"/>
+              </a:lnSpc>
+              <a:spcBef>
+                <a:spcPct val="0"/>
+              </a:spcBef>
+              <a:spcAft>
+                <a:spcPts val="0"/>
+              </a:spcAft>
+              <a:buClrTx/>
+              <a:buSzTx/>
+              <a:buFontTx/>
+              <a:buNone/>
+              <a:tabLst/>
+              <a:defRPr/>
+            </a:pPr>
+            <a:endParaRPr kumimoji="0" lang="es-CO" sz="3600" b="1" u="none" strike="noStrike" kern="1200" cap="none" spc="0" normalizeH="0" baseline="0" noProof="0" dirty="0">
+              <a:ln>
+                <a:noFill/>
+              </a:ln>
+              <a:solidFill>
+                <a:prstClr val="white"/>
+              </a:solidFill>
+              <a:effectLst/>
+              <a:uLnTx/>
+              <a:uFillTx/>
+              <a:latin typeface="WORK SANS BOLD ROMAN" pitchFamily="2" charset="77"/>
+            </a:endParaRPr>
+          </a:p>
+        </p:txBody>
+      </p:sp>
+      <p:sp>
+        <p:nvSpPr>
+          <p:cNvPr id="4" name="CuadroTexto 3">
+            <a:extLst>
+              <a:ext uri="{FF2B5EF4-FFF2-40B4-BE49-F238E27FC236}">
+                <a16:creationId xmlns:a16="http://schemas.microsoft.com/office/drawing/2014/main" id="{D5FCAEE8-76B3-C0F8-92B3-35325F5E78AB}"/>
+              </a:ext>
+            </a:extLst>
+          </p:cNvPr>
+          <p:cNvSpPr txBox="1"/>
+          <p:nvPr/>
+        </p:nvSpPr>
+        <p:spPr>
+          <a:xfrm>
+            <a:off x="456236" y="1318022"/>
+            <a:ext cx="11223145" cy="4801314"/>
+          </a:xfrm>
+          <a:prstGeom prst="rect">
+            <a:avLst/>
+          </a:prstGeom>
+          <a:noFill/>
+        </p:spPr>
+        <p:txBody>
+          <a:bodyPr wrap="square" rtlCol="0">
+            <a:spAutoFit/>
+          </a:bodyPr>
+          <a:lstStyle/>
+          <a:p>
+            <a:r>
+              <a:rPr lang="es-CO" sz="2400" b="1" dirty="0"/>
+              <a:t>HISTORIAL:</a:t>
+            </a:r>
+            <a:br>
+              <a:rPr lang="es-CO" sz="2400" dirty="0"/>
+            </a:br>
+            <a:r>
+              <a:rPr lang="es-CO" sz="2400" dirty="0"/>
+              <a:t>Esta vista estará disponible únicamente para los usuarios que cuenten con el rol de administrador. Aquí se podrán ver todas las reservas que ya se encuentran en estado "Pagada". También se mostrará el total que se ha pagado por cada uno de los métodos de pago disponibles.</a:t>
+            </a:r>
+          </a:p>
+          <a:p>
+            <a:pPr marL="342900" lvl="0" indent="-342900">
+              <a:buFont typeface="Arial" panose="020B0604020202020204" pitchFamily="34" charset="0"/>
+              <a:buChar char="•"/>
+            </a:pPr>
+            <a:r>
+              <a:rPr lang="es-CO" sz="2400" b="1" dirty="0"/>
+              <a:t>Filtrar: </a:t>
+            </a:r>
+            <a:r>
+              <a:rPr lang="es-CO" sz="2400" dirty="0"/>
+              <a:t>Aquí se podrá seleccionar el método de pago por el cual se desea filtrar. Dependiendo del método de pago seleccionado, se mostrarán todas las reservas pagadas con dicho método, junto con el total acumulado correspondiente.</a:t>
+            </a:r>
+          </a:p>
+          <a:p>
+            <a:pPr marL="342900" lvl="0" indent="-342900">
+              <a:buFont typeface="Arial" panose="020B0604020202020204" pitchFamily="34" charset="0"/>
+              <a:buChar char="•"/>
+            </a:pPr>
+            <a:r>
+              <a:rPr lang="es-CO" sz="2400" b="1" dirty="0"/>
+              <a:t>Total: </a:t>
+            </a:r>
+            <a:r>
+              <a:rPr lang="es-CO" sz="2400" dirty="0"/>
+              <a:t>Aquí se mostrará el total que se ha pagado por el método de pago seleccionado en el filtro.</a:t>
+            </a:r>
+          </a:p>
+          <a:p>
+            <a:pPr marL="342900" lvl="0" indent="-342900">
+              <a:buFont typeface="Arial" panose="020B0604020202020204" pitchFamily="34" charset="0"/>
+              <a:buChar char="•"/>
+            </a:pPr>
+            <a:r>
+              <a:rPr lang="es-CO" sz="2400" b="1" dirty="0"/>
+              <a:t>Botón </a:t>
+            </a:r>
+            <a:r>
+              <a:rPr lang="es-CO" sz="2400" b="1" dirty="0" err="1"/>
+              <a:t>Info</a:t>
+            </a:r>
+            <a:r>
+              <a:rPr lang="es-CO" sz="2400" b="1" dirty="0"/>
+              <a:t>: </a:t>
+            </a:r>
+            <a:r>
+              <a:rPr lang="es-CO" sz="2400" dirty="0"/>
+              <a:t>Al hacer clic en este botón se mostrará la información detallada acerca de la reserva, incluyendo los productos consumidos y el detalle de lo que se pagó.</a:t>
+            </a:r>
+          </a:p>
+          <a:p>
+            <a:endParaRPr lang="es-CO" dirty="0"/>
+          </a:p>
+        </p:txBody>
+      </p:sp>
+    </p:spTree>
+    <p:extLst>
+      <p:ext uri="{BB962C8B-B14F-4D97-AF65-F5344CB8AC3E}">
+        <p14:creationId xmlns:p14="http://schemas.microsoft.com/office/powerpoint/2010/main" val="2133519256"/>
+      </p:ext>
+    </p:extLst>
+  </p:cSld>
+  <p:clrMapOvr>
+    <a:masterClrMapping/>
+  </p:clrMapOvr>
+</p:sld>
+</file>
+
+<file path=ppt/slides/slide21.xml><?xml version="1.0" encoding="utf-8"?>
+<p:sld xmlns:a="http://schemas.openxmlformats.org/drawingml/2006/main" xmlns:r="http://schemas.openxmlformats.org/officeDocument/2006/relationships" xmlns:p="http://schemas.openxmlformats.org/presentationml/2006/main">
+  <p:cSld>
+    <p:bg>
+      <p:bgPr>
+        <a:blipFill dpi="0" rotWithShape="1">
+          <a:blip r:embed="rId2">
+            <a:lum/>
+          </a:blip>
+          <a:srcRect/>
+          <a:stretch>
+            <a:fillRect/>
+          </a:stretch>
+        </a:blipFill>
+        <a:effectLst/>
+      </p:bgPr>
+    </p:bg>
+    <p:spTree>
+      <p:nvGrpSpPr>
+        <p:cNvPr id="1" name=""/>
+        <p:cNvGrpSpPr/>
+        <p:nvPr/>
+      </p:nvGrpSpPr>
+      <p:grpSpPr>
+        <a:xfrm>
+          <a:off x="0" y="0"/>
+          <a:ext cx="0" cy="0"/>
+          <a:chOff x="0" y="0"/>
+          <a:chExt cx="0" cy="0"/>
+        </a:xfrm>
+      </p:grpSpPr>
+    </p:spTree>
+    <p:extLst>
+      <p:ext uri="{BB962C8B-B14F-4D97-AF65-F5344CB8AC3E}">
+        <p14:creationId xmlns:p14="http://schemas.microsoft.com/office/powerpoint/2010/main" val="2604626685"/>
       </p:ext>
     </p:extLst>
   </p:cSld>
@@ -7858,7 +8238,7 @@
                 <a:uFillTx/>
                 <a:latin typeface="WORK SANS BOLD ROMAN" pitchFamily="2" charset="77"/>
               </a:rPr>
-              <a:t>Diagrama de casos de uso</a:t>
+              <a:t>Diagrama de casos de uso (Anterior)</a:t>
             </a:r>
           </a:p>
           <a:p>
@@ -7959,7 +8339,7 @@
         <p:cNvPr id="1" name="">
           <a:extLst>
             <a:ext uri="{FF2B5EF4-FFF2-40B4-BE49-F238E27FC236}">
-              <a16:creationId xmlns:a16="http://schemas.microsoft.com/office/drawing/2014/main" id="{21584517-E292-C05C-CC4D-08F1EBC91077}"/>
+              <a16:creationId xmlns:a16="http://schemas.microsoft.com/office/drawing/2014/main" id="{BFE5FFA5-7673-AA59-8FA8-D1A01EC6AA34}"/>
             </a:ext>
           </a:extLst>
         </p:cNvPr>
@@ -7979,7 +8359,7 @@
           <p:cNvPr id="3" name="Título 1">
             <a:extLst>
               <a:ext uri="{FF2B5EF4-FFF2-40B4-BE49-F238E27FC236}">
-                <a16:creationId xmlns:a16="http://schemas.microsoft.com/office/drawing/2014/main" id="{8DD53E92-33A1-FC66-3137-93B49C727B45}"/>
+                <a16:creationId xmlns:a16="http://schemas.microsoft.com/office/drawing/2014/main" id="{70419963-2FF7-53FC-C649-1BF5E1A51EF0}"/>
               </a:ext>
             </a:extLst>
           </p:cNvPr>
@@ -8037,7 +8417,7 @@
               <a:defRPr/>
             </a:pPr>
             <a:r>
-              <a:rPr kumimoji="0" lang="es-MX" sz="3600" b="1" u="none" strike="noStrike" kern="1200" cap="none" spc="0" normalizeH="0" baseline="0" noProof="0" dirty="0">
+              <a:rPr kumimoji="0" lang="es-CO" sz="3600" b="1" u="none" strike="noStrike" kern="1200" cap="none" spc="0" normalizeH="0" baseline="0" noProof="0" dirty="0">
                 <a:ln>
                   <a:noFill/>
                 </a:ln>
@@ -8049,23 +8429,27 @@
                 <a:uFillTx/>
                 <a:latin typeface="WORK SANS BOLD ROMAN" pitchFamily="2" charset="77"/>
               </a:rPr>
-              <a:t>Diagrama entidad </a:t>
-            </a:r>
-            <a:r>
-              <a:rPr kumimoji="0" lang="es-MX" sz="3600" b="1" u="none" strike="noStrike" kern="1200" cap="none" spc="0" normalizeH="0" baseline="0" noProof="0" dirty="0" err="1">
-                <a:ln>
-                  <a:noFill/>
-                </a:ln>
-                <a:solidFill>
-                  <a:prstClr val="white"/>
-                </a:solidFill>
-                <a:effectLst/>
-                <a:uLnTx/>
-                <a:uFillTx/>
-                <a:latin typeface="WORK SANS BOLD ROMAN" pitchFamily="2" charset="77"/>
-              </a:rPr>
-              <a:t>relacion</a:t>
-            </a:r>
+              <a:t>Diagrama de casos de uso (Nuevo)</a:t>
+            </a:r>
+          </a:p>
+          <a:p>
+            <a:pPr marL="0" marR="0" lvl="0" indent="0" algn="l" defTabSz="914400" rtl="0" eaLnBrk="1" fontAlgn="auto" latinLnBrk="0" hangingPunct="1">
+              <a:lnSpc>
+                <a:spcPct val="90000"/>
+              </a:lnSpc>
+              <a:spcBef>
+                <a:spcPct val="0"/>
+              </a:spcBef>
+              <a:spcAft>
+                <a:spcPts val="0"/>
+              </a:spcAft>
+              <a:buClrTx/>
+              <a:buSzTx/>
+              <a:buFontTx/>
+              <a:buNone/>
+              <a:tabLst/>
+              <a:defRPr/>
+            </a:pPr>
             <a:endParaRPr kumimoji="0" lang="es-CO" sz="3600" b="1" u="none" strike="noStrike" kern="1200" cap="none" spc="0" normalizeH="0" baseline="0" noProof="0" dirty="0">
               <a:ln>
                 <a:noFill/>
@@ -8086,7 +8470,7 @@
           <p:cNvPr id="4" name="Imagen 3" descr="Diagrama&#10;&#10;El contenido generado por IA puede ser incorrecto.">
             <a:extLst>
               <a:ext uri="{FF2B5EF4-FFF2-40B4-BE49-F238E27FC236}">
-                <a16:creationId xmlns:a16="http://schemas.microsoft.com/office/drawing/2014/main" id="{59073834-15CA-A7F2-FFF1-026DB0DCC91F}"/>
+                <a16:creationId xmlns:a16="http://schemas.microsoft.com/office/drawing/2014/main" id="{EB543DD2-D992-6885-C6E7-DE1F5A9D5D77}"/>
               </a:ext>
             </a:extLst>
           </p:cNvPr>
@@ -8103,8 +8487,8 @@
         </p:blipFill>
         <p:spPr>
           <a:xfrm>
-            <a:off x="0" y="1343890"/>
-            <a:ext cx="12192000" cy="5514109"/>
+            <a:off x="209863" y="1394085"/>
+            <a:ext cx="11782268" cy="5338358"/>
           </a:xfrm>
           <a:prstGeom prst="rect">
             <a:avLst/>
@@ -8114,7 +8498,7 @@
     </p:spTree>
     <p:extLst>
       <p:ext uri="{BB962C8B-B14F-4D97-AF65-F5344CB8AC3E}">
-        <p14:creationId xmlns:p14="http://schemas.microsoft.com/office/powerpoint/2010/main" val="593768045"/>
+        <p14:creationId xmlns:p14="http://schemas.microsoft.com/office/powerpoint/2010/main" val="3582733309"/>
       </p:ext>
     </p:extLst>
   </p:cSld>

</xml_diff>